<commit_message>
Euler Formula / pic1 upload
</commit_message>
<xml_diff>
--- a/pics/2020-07-07-Euler_Formula/pics.pptx
+++ b/pics/2020-07-07-Euler_Formula/pics.pptx
@@ -5,10 +5,11 @@
     <p:sldMasterId id="2147483648" r:id="rId1"/>
   </p:sldMasterIdLst>
   <p:sldIdLst>
-    <p:sldId id="258" r:id="rId2"/>
-    <p:sldId id="256" r:id="rId3"/>
-    <p:sldId id="257" r:id="rId4"/>
-    <p:sldId id="259" r:id="rId5"/>
+    <p:sldId id="260" r:id="rId2"/>
+    <p:sldId id="258" r:id="rId3"/>
+    <p:sldId id="256" r:id="rId4"/>
+    <p:sldId id="257" r:id="rId5"/>
+    <p:sldId id="259" r:id="rId6"/>
   </p:sldIdLst>
   <p:sldSz cx="9144000" cy="6858000" type="screen4x3"/>
   <p:notesSz cx="6858000" cy="9144000"/>
@@ -3100,6 +3101,516 @@
       </p:grpSpPr>
       <p:pic>
         <p:nvPicPr>
+          <p:cNvPr id="2052" name="Picture 4"/>
+          <p:cNvPicPr>
+            <a:picLocks noChangeAspect="1" noChangeArrowheads="1"/>
+          </p:cNvPicPr>
+          <p:nvPr/>
+        </p:nvPicPr>
+        <p:blipFill>
+          <a:blip r:embed="rId2">
+            <a:extLst>
+              <a:ext uri="{28A0092B-C50C-407E-A947-70E740481C1C}">
+                <a14:useLocalDpi xmlns:a14="http://schemas.microsoft.com/office/drawing/2010/main" val="0"/>
+              </a:ext>
+            </a:extLst>
+          </a:blip>
+          <a:srcRect/>
+          <a:stretch>
+            <a:fillRect/>
+          </a:stretch>
+        </p:blipFill>
+        <p:spPr bwMode="auto">
+          <a:xfrm>
+            <a:off x="-185738" y="341313"/>
+            <a:ext cx="9515476" cy="6181725"/>
+          </a:xfrm>
+          <a:prstGeom prst="rect">
+            <a:avLst/>
+          </a:prstGeom>
+          <a:noFill/>
+          <a:ln>
+            <a:noFill/>
+          </a:ln>
+          <a:effectLst/>
+          <a:extLst>
+            <a:ext uri="{909E8E84-426E-40DD-AFC4-6F175D3DCCD1}">
+              <a14:hiddenFill xmlns:a14="http://schemas.microsoft.com/office/drawing/2010/main">
+                <a:solidFill>
+                  <a:schemeClr val="accent1"/>
+                </a:solidFill>
+              </a14:hiddenFill>
+            </a:ext>
+            <a:ext uri="{91240B29-F687-4F45-9708-019B960494DF}">
+              <a14:hiddenLine xmlns:a14="http://schemas.microsoft.com/office/drawing/2010/main" w="9525">
+                <a:solidFill>
+                  <a:schemeClr val="tx1"/>
+                </a:solidFill>
+                <a:miter lim="800000"/>
+                <a:headEnd/>
+                <a:tailEnd/>
+              </a14:hiddenLine>
+            </a:ext>
+            <a:ext uri="{AF507438-7753-43E0-B8FC-AC1667EBCBE1}">
+              <a14:hiddenEffects xmlns:a14="http://schemas.microsoft.com/office/drawing/2010/main">
+                <a:effectLst>
+                  <a:outerShdw dist="35921" dir="2700000" algn="ctr" rotWithShape="0">
+                    <a:schemeClr val="bg2"/>
+                  </a:outerShdw>
+                </a:effectLst>
+              </a14:hiddenEffects>
+            </a:ext>
+          </a:extLst>
+        </p:spPr>
+      </p:pic>
+      <mc:AlternateContent xmlns:mc="http://schemas.openxmlformats.org/markup-compatibility/2006">
+        <mc:Choice xmlns:a14="http://schemas.microsoft.com/office/drawing/2010/main" Requires="a14">
+          <p:sp>
+            <p:nvSpPr>
+              <p:cNvPr id="4" name="TextBox 3"/>
+              <p:cNvSpPr txBox="1"/>
+              <p:nvPr/>
+            </p:nvSpPr>
+            <p:spPr>
+              <a:xfrm>
+                <a:off x="3779912" y="2633990"/>
+                <a:ext cx="2276200" cy="369332"/>
+              </a:xfrm>
+              <a:prstGeom prst="rect">
+                <a:avLst/>
+              </a:prstGeom>
+              <a:noFill/>
+            </p:spPr>
+            <p:txBody>
+              <a:bodyPr wrap="none" rtlCol="0">
+                <a:spAutoFit/>
+              </a:bodyPr>
+              <a:lstStyle/>
+              <a:p>
+                <a14:m>
+                  <m:oMathPara xmlns:m="http://schemas.openxmlformats.org/officeDocument/2006/math">
+                    <m:oMathParaPr>
+                      <m:jc m:val="centerGroup"/>
+                    </m:oMathParaPr>
+                    <m:oMath xmlns:m="http://schemas.openxmlformats.org/officeDocument/2006/math">
+                      <m:d>
+                        <m:dPr>
+                          <m:ctrlPr>
+                            <a:rPr lang="en-US" altLang="ko-KR" b="0" i="1" smtClean="0">
+                              <a:latin typeface="Cambria Math"/>
+                            </a:rPr>
+                          </m:ctrlPr>
+                        </m:dPr>
+                        <m:e>
+                          <m:r>
+                            <a:rPr lang="en-US" altLang="ko-KR" b="0" i="1" smtClean="0">
+                              <a:latin typeface="Cambria Math"/>
+                            </a:rPr>
+                            <m:t>𝑥</m:t>
+                          </m:r>
+                          <m:r>
+                            <a:rPr lang="en-US" altLang="ko-KR" b="0" i="1" smtClean="0">
+                              <a:latin typeface="Cambria Math"/>
+                            </a:rPr>
+                            <m:t>,</m:t>
+                          </m:r>
+                          <m:r>
+                            <a:rPr lang="en-US" altLang="ko-KR" b="0" i="1" smtClean="0">
+                              <a:latin typeface="Cambria Math"/>
+                            </a:rPr>
+                            <m:t>𝑦</m:t>
+                          </m:r>
+                        </m:e>
+                      </m:d>
+                      <m:r>
+                        <a:rPr lang="en-US" altLang="ko-KR" b="0" i="1" smtClean="0">
+                          <a:latin typeface="Cambria Math"/>
+                        </a:rPr>
+                        <m:t>=</m:t>
+                      </m:r>
+                      <m:r>
+                        <a:rPr lang="en-US" altLang="ko-KR" b="0" i="0" smtClean="0">
+                          <a:latin typeface="Cambria Math"/>
+                        </a:rPr>
+                        <m:t>(</m:t>
+                      </m:r>
+                      <m:r>
+                        <m:rPr>
+                          <m:sty m:val="p"/>
+                        </m:rPr>
+                        <a:rPr lang="en-US" altLang="ko-KR" b="0" i="0" smtClean="0">
+                          <a:latin typeface="Cambria Math"/>
+                        </a:rPr>
+                        <m:t>cos</m:t>
+                      </m:r>
+                      <m:r>
+                        <a:rPr lang="en-US" altLang="ko-KR" b="0" i="1" smtClean="0">
+                          <a:latin typeface="Cambria Math"/>
+                        </a:rPr>
+                        <m:t>𝜃</m:t>
+                      </m:r>
+                      <m:r>
+                        <a:rPr lang="en-US" altLang="ko-KR" b="0" i="1" smtClean="0">
+                          <a:latin typeface="Cambria Math"/>
+                        </a:rPr>
+                        <m:t>,</m:t>
+                      </m:r>
+                      <m:r>
+                        <m:rPr>
+                          <m:sty m:val="p"/>
+                        </m:rPr>
+                        <a:rPr lang="en-US" altLang="ko-KR" b="0" i="0" smtClean="0">
+                          <a:latin typeface="Cambria Math"/>
+                        </a:rPr>
+                        <m:t>sin</m:t>
+                      </m:r>
+                      <m:r>
+                        <a:rPr lang="en-US" altLang="ko-KR" i="1">
+                          <a:latin typeface="Cambria Math"/>
+                        </a:rPr>
+                        <m:t>𝜃</m:t>
+                      </m:r>
+                      <m:r>
+                        <a:rPr lang="en-US" altLang="ko-KR" b="0" i="1" smtClean="0">
+                          <a:latin typeface="Cambria Math"/>
+                        </a:rPr>
+                        <m:t>)</m:t>
+                      </m:r>
+                    </m:oMath>
+                  </m:oMathPara>
+                </a14:m>
+                <a:endParaRPr lang="ko-KR" altLang="en-US" dirty="0"/>
+              </a:p>
+            </p:txBody>
+          </p:sp>
+        </mc:Choice>
+        <mc:Fallback>
+          <p:sp>
+            <p:nvSpPr>
+              <p:cNvPr id="4" name="TextBox 3"/>
+              <p:cNvSpPr txBox="1">
+                <a:spLocks noRot="1" noChangeAspect="1" noMove="1" noResize="1" noEditPoints="1" noAdjustHandles="1" noChangeArrowheads="1" noChangeShapeType="1" noTextEdit="1"/>
+              </p:cNvSpPr>
+              <p:nvPr/>
+            </p:nvSpPr>
+            <p:spPr>
+              <a:xfrm>
+                <a:off x="3779912" y="2633990"/>
+                <a:ext cx="2276200" cy="369332"/>
+              </a:xfrm>
+              <a:prstGeom prst="rect">
+                <a:avLst/>
+              </a:prstGeom>
+              <a:blipFill rotWithShape="1">
+                <a:blip r:embed="rId3"/>
+                <a:stretch>
+                  <a:fillRect b="-14754"/>
+                </a:stretch>
+              </a:blipFill>
+            </p:spPr>
+            <p:txBody>
+              <a:bodyPr/>
+              <a:lstStyle/>
+              <a:p>
+                <a:r>
+                  <a:rPr lang="ko-KR" altLang="en-US">
+                    <a:noFill/>
+                  </a:rPr>
+                  <a:t> </a:t>
+                </a:r>
+              </a:p>
+            </p:txBody>
+          </p:sp>
+        </mc:Fallback>
+      </mc:AlternateContent>
+      <mc:AlternateContent xmlns:mc="http://schemas.openxmlformats.org/markup-compatibility/2006">
+        <mc:Choice xmlns:a14="http://schemas.microsoft.com/office/drawing/2010/main" Requires="a14">
+          <p:sp>
+            <p:nvSpPr>
+              <p:cNvPr id="7" name="TextBox 6"/>
+              <p:cNvSpPr txBox="1"/>
+              <p:nvPr/>
+            </p:nvSpPr>
+            <p:spPr>
+              <a:xfrm>
+                <a:off x="3016878" y="4931876"/>
+                <a:ext cx="402994" cy="369332"/>
+              </a:xfrm>
+              <a:prstGeom prst="rect">
+                <a:avLst/>
+              </a:prstGeom>
+              <a:noFill/>
+            </p:spPr>
+            <p:txBody>
+              <a:bodyPr wrap="none" rtlCol="0">
+                <a:spAutoFit/>
+              </a:bodyPr>
+              <a:lstStyle/>
+              <a:p>
+                <a14:m>
+                  <m:oMathPara xmlns:m="http://schemas.openxmlformats.org/officeDocument/2006/math">
+                    <m:oMathParaPr>
+                      <m:jc m:val="centerGroup"/>
+                    </m:oMathParaPr>
+                    <m:oMath xmlns:m="http://schemas.openxmlformats.org/officeDocument/2006/math">
+                      <m:r>
+                        <a:rPr lang="en-US" altLang="ko-KR" b="0" i="1" smtClean="0">
+                          <a:latin typeface="Cambria Math"/>
+                        </a:rPr>
+                        <m:t>𝜃</m:t>
+                      </m:r>
+                    </m:oMath>
+                  </m:oMathPara>
+                </a14:m>
+                <a:endParaRPr lang="ko-KR" altLang="en-US" dirty="0"/>
+              </a:p>
+            </p:txBody>
+          </p:sp>
+        </mc:Choice>
+        <mc:Fallback>
+          <p:sp>
+            <p:nvSpPr>
+              <p:cNvPr id="7" name="TextBox 6"/>
+              <p:cNvSpPr txBox="1">
+                <a:spLocks noRot="1" noChangeAspect="1" noMove="1" noResize="1" noEditPoints="1" noAdjustHandles="1" noChangeArrowheads="1" noChangeShapeType="1" noTextEdit="1"/>
+              </p:cNvSpPr>
+              <p:nvPr/>
+            </p:nvSpPr>
+            <p:spPr>
+              <a:xfrm>
+                <a:off x="3016878" y="4931876"/>
+                <a:ext cx="402994" cy="369332"/>
+              </a:xfrm>
+              <a:prstGeom prst="rect">
+                <a:avLst/>
+              </a:prstGeom>
+              <a:blipFill rotWithShape="1">
+                <a:blip r:embed="rId4"/>
+                <a:stretch>
+                  <a:fillRect/>
+                </a:stretch>
+              </a:blipFill>
+            </p:spPr>
+            <p:txBody>
+              <a:bodyPr/>
+              <a:lstStyle/>
+              <a:p>
+                <a:r>
+                  <a:rPr lang="ko-KR" altLang="en-US">
+                    <a:noFill/>
+                  </a:rPr>
+                  <a:t> </a:t>
+                </a:r>
+              </a:p>
+            </p:txBody>
+          </p:sp>
+        </mc:Fallback>
+      </mc:AlternateContent>
+      <mc:AlternateContent xmlns:mc="http://schemas.openxmlformats.org/markup-compatibility/2006">
+        <mc:Choice xmlns:a14="http://schemas.microsoft.com/office/drawing/2010/main" Requires="a14">
+          <p:sp>
+            <p:nvSpPr>
+              <p:cNvPr id="9" name="TextBox 8"/>
+              <p:cNvSpPr txBox="1"/>
+              <p:nvPr/>
+            </p:nvSpPr>
+            <p:spPr>
+              <a:xfrm>
+                <a:off x="4706512" y="5301208"/>
+                <a:ext cx="396840" cy="369332"/>
+              </a:xfrm>
+              <a:prstGeom prst="rect">
+                <a:avLst/>
+              </a:prstGeom>
+              <a:noFill/>
+            </p:spPr>
+            <p:txBody>
+              <a:bodyPr wrap="none" rtlCol="0">
+                <a:spAutoFit/>
+              </a:bodyPr>
+              <a:lstStyle/>
+              <a:p>
+                <a14:m>
+                  <m:oMathPara xmlns:m="http://schemas.openxmlformats.org/officeDocument/2006/math">
+                    <m:oMathParaPr>
+                      <m:jc m:val="centerGroup"/>
+                    </m:oMathParaPr>
+                    <m:oMath xmlns:m="http://schemas.openxmlformats.org/officeDocument/2006/math">
+                      <m:r>
+                        <a:rPr lang="en-US" altLang="ko-KR" b="0" i="1" smtClean="0">
+                          <a:latin typeface="Cambria Math"/>
+                        </a:rPr>
+                        <m:t>𝑥</m:t>
+                      </m:r>
+                    </m:oMath>
+                  </m:oMathPara>
+                </a14:m>
+                <a:endParaRPr lang="ko-KR" altLang="en-US" dirty="0"/>
+              </a:p>
+            </p:txBody>
+          </p:sp>
+        </mc:Choice>
+        <mc:Fallback>
+          <p:sp>
+            <p:nvSpPr>
+              <p:cNvPr id="9" name="TextBox 8"/>
+              <p:cNvSpPr txBox="1">
+                <a:spLocks noRot="1" noChangeAspect="1" noMove="1" noResize="1" noEditPoints="1" noAdjustHandles="1" noChangeArrowheads="1" noChangeShapeType="1" noTextEdit="1"/>
+              </p:cNvSpPr>
+              <p:nvPr/>
+            </p:nvSpPr>
+            <p:spPr>
+              <a:xfrm>
+                <a:off x="4706512" y="5301208"/>
+                <a:ext cx="396840" cy="369332"/>
+              </a:xfrm>
+              <a:prstGeom prst="rect">
+                <a:avLst/>
+              </a:prstGeom>
+              <a:blipFill rotWithShape="1">
+                <a:blip r:embed="rId5"/>
+                <a:stretch>
+                  <a:fillRect/>
+                </a:stretch>
+              </a:blipFill>
+            </p:spPr>
+            <p:txBody>
+              <a:bodyPr/>
+              <a:lstStyle/>
+              <a:p>
+                <a:r>
+                  <a:rPr lang="ko-KR" altLang="en-US">
+                    <a:noFill/>
+                  </a:rPr>
+                  <a:t> </a:t>
+                </a:r>
+              </a:p>
+            </p:txBody>
+          </p:sp>
+        </mc:Fallback>
+      </mc:AlternateContent>
+      <mc:AlternateContent xmlns:mc="http://schemas.openxmlformats.org/markup-compatibility/2006">
+        <mc:Choice xmlns:a14="http://schemas.microsoft.com/office/drawing/2010/main" Requires="a14">
+          <p:sp>
+            <p:nvSpPr>
+              <p:cNvPr id="10" name="TextBox 9"/>
+              <p:cNvSpPr txBox="1"/>
+              <p:nvPr/>
+            </p:nvSpPr>
+            <p:spPr>
+              <a:xfrm>
+                <a:off x="2415904" y="2987660"/>
+                <a:ext cx="396840" cy="369332"/>
+              </a:xfrm>
+              <a:prstGeom prst="rect">
+                <a:avLst/>
+              </a:prstGeom>
+              <a:noFill/>
+            </p:spPr>
+            <p:txBody>
+              <a:bodyPr wrap="none" rtlCol="0">
+                <a:spAutoFit/>
+              </a:bodyPr>
+              <a:lstStyle/>
+              <a:p>
+                <a14:m>
+                  <m:oMathPara xmlns:m="http://schemas.openxmlformats.org/officeDocument/2006/math">
+                    <m:oMathParaPr>
+                      <m:jc m:val="centerGroup"/>
+                    </m:oMathParaPr>
+                    <m:oMath xmlns:m="http://schemas.openxmlformats.org/officeDocument/2006/math">
+                      <m:r>
+                        <a:rPr lang="en-US" altLang="ko-KR" b="0" i="1" smtClean="0">
+                          <a:latin typeface="Cambria Math"/>
+                        </a:rPr>
+                        <m:t>𝑦</m:t>
+                      </m:r>
+                    </m:oMath>
+                  </m:oMathPara>
+                </a14:m>
+                <a:endParaRPr lang="ko-KR" altLang="en-US" dirty="0"/>
+              </a:p>
+            </p:txBody>
+          </p:sp>
+        </mc:Choice>
+        <mc:Fallback>
+          <p:sp>
+            <p:nvSpPr>
+              <p:cNvPr id="10" name="TextBox 9"/>
+              <p:cNvSpPr txBox="1">
+                <a:spLocks noRot="1" noChangeAspect="1" noMove="1" noResize="1" noEditPoints="1" noAdjustHandles="1" noChangeArrowheads="1" noChangeShapeType="1" noTextEdit="1"/>
+              </p:cNvSpPr>
+              <p:nvPr/>
+            </p:nvSpPr>
+            <p:spPr>
+              <a:xfrm>
+                <a:off x="2415904" y="2987660"/>
+                <a:ext cx="396840" cy="369332"/>
+              </a:xfrm>
+              <a:prstGeom prst="rect">
+                <a:avLst/>
+              </a:prstGeom>
+              <a:blipFill rotWithShape="1">
+                <a:blip r:embed="rId6"/>
+                <a:stretch>
+                  <a:fillRect b="-8197"/>
+                </a:stretch>
+              </a:blipFill>
+            </p:spPr>
+            <p:txBody>
+              <a:bodyPr/>
+              <a:lstStyle/>
+              <a:p>
+                <a:r>
+                  <a:rPr lang="ko-KR" altLang="en-US">
+                    <a:noFill/>
+                  </a:rPr>
+                  <a:t> </a:t>
+                </a:r>
+              </a:p>
+            </p:txBody>
+          </p:sp>
+        </mc:Fallback>
+      </mc:AlternateContent>
+    </p:spTree>
+    <p:extLst>
+      <p:ext uri="{BB962C8B-B14F-4D97-AF65-F5344CB8AC3E}">
+        <p14:creationId xmlns:p14="http://schemas.microsoft.com/office/powerpoint/2010/main" val="198619640"/>
+      </p:ext>
+    </p:extLst>
+  </p:cSld>
+  <p:clrMapOvr>
+    <a:masterClrMapping/>
+  </p:clrMapOvr>
+  <p:timing>
+    <p:tnLst>
+      <p:par>
+        <p:cTn id="1" dur="indefinite" restart="never" nodeType="tmRoot"/>
+      </p:par>
+    </p:tnLst>
+  </p:timing>
+</p:sld>
+</file>
+
+<file path=ppt/slides/slide2.xml><?xml version="1.0" encoding="utf-8"?>
+<p:sld xmlns:a="http://schemas.openxmlformats.org/drawingml/2006/main" xmlns:r="http://schemas.openxmlformats.org/officeDocument/2006/relationships" xmlns:p="http://schemas.openxmlformats.org/presentationml/2006/main">
+  <p:cSld>
+    <p:spTree>
+      <p:nvGrpSpPr>
+        <p:cNvPr id="1" name=""/>
+        <p:cNvGrpSpPr/>
+        <p:nvPr/>
+      </p:nvGrpSpPr>
+      <p:grpSpPr>
+        <a:xfrm>
+          <a:off x="0" y="0"/>
+          <a:ext cx="0" cy="0"/>
+          <a:chOff x="0" y="0"/>
+          <a:chExt cx="0" cy="0"/>
+        </a:xfrm>
+      </p:grpSpPr>
+      <p:pic>
+        <p:nvPicPr>
           <p:cNvPr id="1026" name="Picture 2" descr="D:\angeloyeo.github.io\pics\2020-07-07-Euler_Formula\euler_n_1.png"/>
           <p:cNvPicPr>
             <a:picLocks noChangeAspect="1" noChangeArrowheads="1"/>
@@ -3260,7 +3771,7 @@
 </p:sld>
 </file>
 
-<file path=ppt/slides/slide2.xml><?xml version="1.0" encoding="utf-8"?>
+<file path=ppt/slides/slide3.xml><?xml version="1.0" encoding="utf-8"?>
 <p:sld xmlns:a="http://schemas.openxmlformats.org/drawingml/2006/main" xmlns:r="http://schemas.openxmlformats.org/officeDocument/2006/relationships" xmlns:p="http://schemas.openxmlformats.org/presentationml/2006/main">
   <p:cSld>
     <p:spTree>
@@ -4193,7 +4704,7 @@
 </p:sld>
 </file>
 
-<file path=ppt/slides/slide3.xml><?xml version="1.0" encoding="utf-8"?>
+<file path=ppt/slides/slide4.xml><?xml version="1.0" encoding="utf-8"?>
 <p:sld xmlns:a="http://schemas.openxmlformats.org/drawingml/2006/main" xmlns:r="http://schemas.openxmlformats.org/officeDocument/2006/relationships" xmlns:p="http://schemas.openxmlformats.org/presentationml/2006/main">
   <p:cSld>
     <p:spTree>
@@ -5481,7 +5992,7 @@
 </p:sld>
 </file>
 
-<file path=ppt/slides/slide4.xml><?xml version="1.0" encoding="utf-8"?>
+<file path=ppt/slides/slide5.xml><?xml version="1.0" encoding="utf-8"?>
 <p:sld xmlns:a="http://schemas.openxmlformats.org/drawingml/2006/main" xmlns:r="http://schemas.openxmlformats.org/officeDocument/2006/relationships" xmlns:p="http://schemas.openxmlformats.org/presentationml/2006/main">
   <p:cSld>
     <p:spTree>

</xml_diff>